<commit_message>
Update ETL Project PowerPoint.pptx
</commit_message>
<xml_diff>
--- a/ETL Project PowerPoint.pptx
+++ b/ETL Project PowerPoint.pptx
@@ -10,11 +10,9 @@
     <p:sldId id="260" r:id="rId4"/>
     <p:sldId id="258" r:id="rId5"/>
     <p:sldId id="261" r:id="rId6"/>
-    <p:sldId id="264" r:id="rId7"/>
-    <p:sldId id="265" r:id="rId8"/>
-    <p:sldId id="266" r:id="rId9"/>
-    <p:sldId id="263" r:id="rId10"/>
-    <p:sldId id="262" r:id="rId11"/>
+    <p:sldId id="265" r:id="rId7"/>
+    <p:sldId id="263" r:id="rId8"/>
+    <p:sldId id="262" r:id="rId9"/>
   </p:sldIdLst>
   <p:sldSz cx="12192000" cy="6858000"/>
   <p:notesSz cx="6858000" cy="9144000"/>
@@ -121,6 +119,375 @@
 </p:presentation>
 </file>
 
+<file path=ppt/revisionInfo.xml><?xml version="1.0" encoding="utf-8"?>
+<p1510:revInfo xmlns:a="http://schemas.openxmlformats.org/drawingml/2006/main" xmlns:r="http://schemas.openxmlformats.org/officeDocument/2006/relationships" xmlns:p1510="http://schemas.microsoft.com/office/powerpoint/2015/10/main">
+  <p1510:revLst>
+    <p1510:client id="{2952D031-7BD2-46F3-9967-CF46784C67A1}" v="18" dt="2020-01-18T14:16:45.635"/>
+  </p1510:revLst>
+</p1510:revInfo>
+</file>
+
+<file path=ppt/changesInfos/changesInfo1.xml><?xml version="1.0" encoding="utf-8"?>
+<pc:chgInfo xmlns:a="http://schemas.openxmlformats.org/drawingml/2006/main" xmlns:r="http://schemas.openxmlformats.org/officeDocument/2006/relationships" xmlns:ac="http://schemas.microsoft.com/office/drawing/2013/main/command" xmlns:pc="http://schemas.microsoft.com/office/powerpoint/2013/main/command">
+  <pc:docChgLst>
+    <pc:chgData name="Patricia Wong" userId="07b7957ca70a4ba9" providerId="LiveId" clId="{2952D031-7BD2-46F3-9967-CF46784C67A1}"/>
+    <pc:docChg chg="undo custSel mod delSld modSld">
+      <pc:chgData name="Patricia Wong" userId="07b7957ca70a4ba9" providerId="LiveId" clId="{2952D031-7BD2-46F3-9967-CF46784C67A1}" dt="2020-01-18T14:16:54.791" v="190" actId="26606"/>
+      <pc:docMkLst>
+        <pc:docMk/>
+      </pc:docMkLst>
+      <pc:sldChg chg="addSp delSp modSp">
+        <pc:chgData name="Patricia Wong" userId="07b7957ca70a4ba9" providerId="LiveId" clId="{2952D031-7BD2-46F3-9967-CF46784C67A1}" dt="2020-01-18T14:16:54.791" v="190" actId="26606"/>
+        <pc:sldMkLst>
+          <pc:docMk/>
+          <pc:sldMk cId="920351850" sldId="260"/>
+        </pc:sldMkLst>
+        <pc:spChg chg="mod">
+          <ac:chgData name="Patricia Wong" userId="07b7957ca70a4ba9" providerId="LiveId" clId="{2952D031-7BD2-46F3-9967-CF46784C67A1}" dt="2020-01-18T14:16:54.791" v="190" actId="26606"/>
+          <ac:spMkLst>
+            <pc:docMk/>
+            <pc:sldMk cId="920351850" sldId="260"/>
+            <ac:spMk id="2" creationId="{77B5B6C2-15F6-479D-93FC-07C55FB23B3F}"/>
+          </ac:spMkLst>
+        </pc:spChg>
+        <pc:spChg chg="del mod">
+          <ac:chgData name="Patricia Wong" userId="07b7957ca70a4ba9" providerId="LiveId" clId="{2952D031-7BD2-46F3-9967-CF46784C67A1}" dt="2020-01-18T14:16:54.791" v="190" actId="26606"/>
+          <ac:spMkLst>
+            <pc:docMk/>
+            <pc:sldMk cId="920351850" sldId="260"/>
+            <ac:spMk id="4" creationId="{83F2783B-6462-444F-A269-5A0E5E70C3B6}"/>
+          </ac:spMkLst>
+        </pc:spChg>
+        <pc:spChg chg="del">
+          <ac:chgData name="Patricia Wong" userId="07b7957ca70a4ba9" providerId="LiveId" clId="{2952D031-7BD2-46F3-9967-CF46784C67A1}" dt="2020-01-18T14:16:12.565" v="182" actId="931"/>
+          <ac:spMkLst>
+            <pc:docMk/>
+            <pc:sldMk cId="920351850" sldId="260"/>
+            <ac:spMk id="5" creationId="{61DDC29B-8CC6-488C-A221-D2617518FA20}"/>
+          </ac:spMkLst>
+        </pc:spChg>
+        <pc:spChg chg="add del mod">
+          <ac:chgData name="Patricia Wong" userId="07b7957ca70a4ba9" providerId="LiveId" clId="{2952D031-7BD2-46F3-9967-CF46784C67A1}" dt="2020-01-18T14:16:45.634" v="187" actId="931"/>
+          <ac:spMkLst>
+            <pc:docMk/>
+            <pc:sldMk cId="920351850" sldId="260"/>
+            <ac:spMk id="8" creationId="{ADECF007-00D6-45FD-93AD-F9DC88A1D6CD}"/>
+          </ac:spMkLst>
+        </pc:spChg>
+        <pc:spChg chg="del">
+          <ac:chgData name="Patricia Wong" userId="07b7957ca70a4ba9" providerId="LiveId" clId="{2952D031-7BD2-46F3-9967-CF46784C67A1}" dt="2020-01-18T14:16:54.791" v="190" actId="26606"/>
+          <ac:spMkLst>
+            <pc:docMk/>
+            <pc:sldMk cId="920351850" sldId="260"/>
+            <ac:spMk id="13" creationId="{50B488F5-9CE4-4346-B22F-600286ED4D8F}"/>
+          </ac:spMkLst>
+        </pc:spChg>
+        <pc:spChg chg="add">
+          <ac:chgData name="Patricia Wong" userId="07b7957ca70a4ba9" providerId="LiveId" clId="{2952D031-7BD2-46F3-9967-CF46784C67A1}" dt="2020-01-18T14:16:54.791" v="190" actId="26606"/>
+          <ac:spMkLst>
+            <pc:docMk/>
+            <pc:sldMk cId="920351850" sldId="260"/>
+            <ac:spMk id="24" creationId="{45B2D936-4E08-4928-90A3-EB1B6784A5DE}"/>
+          </ac:spMkLst>
+        </pc:spChg>
+        <pc:picChg chg="add del mod">
+          <ac:chgData name="Patricia Wong" userId="07b7957ca70a4ba9" providerId="LiveId" clId="{2952D031-7BD2-46F3-9967-CF46784C67A1}" dt="2020-01-18T14:16:16.029" v="186" actId="478"/>
+          <ac:picMkLst>
+            <pc:docMk/>
+            <pc:sldMk cId="920351850" sldId="260"/>
+            <ac:picMk id="6" creationId="{301F19D0-665E-41A9-8600-4BBDC77C3A73}"/>
+          </ac:picMkLst>
+        </pc:picChg>
+        <pc:picChg chg="add mod">
+          <ac:chgData name="Patricia Wong" userId="07b7957ca70a4ba9" providerId="LiveId" clId="{2952D031-7BD2-46F3-9967-CF46784C67A1}" dt="2020-01-18T14:16:54.791" v="190" actId="26606"/>
+          <ac:picMkLst>
+            <pc:docMk/>
+            <pc:sldMk cId="920351850" sldId="260"/>
+            <ac:picMk id="10" creationId="{99B726DA-7D60-470A-B629-C6104373CD66}"/>
+          </ac:picMkLst>
+        </pc:picChg>
+        <pc:picChg chg="del">
+          <ac:chgData name="Patricia Wong" userId="07b7957ca70a4ba9" providerId="LiveId" clId="{2952D031-7BD2-46F3-9967-CF46784C67A1}" dt="2020-01-18T14:16:54.791" v="190" actId="26606"/>
+          <ac:picMkLst>
+            <pc:docMk/>
+            <pc:sldMk cId="920351850" sldId="260"/>
+            <ac:picMk id="11" creationId="{CB1DE69F-569C-4A49-8E50-4093C135AECF}"/>
+          </ac:picMkLst>
+        </pc:picChg>
+        <pc:picChg chg="del">
+          <ac:chgData name="Patricia Wong" userId="07b7957ca70a4ba9" providerId="LiveId" clId="{2952D031-7BD2-46F3-9967-CF46784C67A1}" dt="2020-01-18T14:16:54.791" v="190" actId="26606"/>
+          <ac:picMkLst>
+            <pc:docMk/>
+            <pc:sldMk cId="920351850" sldId="260"/>
+            <ac:picMk id="17" creationId="{38DB3A91-B9E8-4451-ACED-026398635D07}"/>
+          </ac:picMkLst>
+        </pc:picChg>
+        <pc:picChg chg="add">
+          <ac:chgData name="Patricia Wong" userId="07b7957ca70a4ba9" providerId="LiveId" clId="{2952D031-7BD2-46F3-9967-CF46784C67A1}" dt="2020-01-18T14:16:54.791" v="190" actId="26606"/>
+          <ac:picMkLst>
+            <pc:docMk/>
+            <pc:sldMk cId="920351850" sldId="260"/>
+            <ac:picMk id="22" creationId="{907B27AF-AFED-4FF4-8065-09E2ECD43159}"/>
+          </ac:picMkLst>
+        </pc:picChg>
+        <pc:picChg chg="add">
+          <ac:chgData name="Patricia Wong" userId="07b7957ca70a4ba9" providerId="LiveId" clId="{2952D031-7BD2-46F3-9967-CF46784C67A1}" dt="2020-01-18T14:16:54.791" v="190" actId="26606"/>
+          <ac:picMkLst>
+            <pc:docMk/>
+            <pc:sldMk cId="920351850" sldId="260"/>
+            <ac:picMk id="28" creationId="{AAFAFBB4-6847-45A2-97CE-8853D99697AC}"/>
+          </ac:picMkLst>
+        </pc:picChg>
+        <pc:cxnChg chg="del">
+          <ac:chgData name="Patricia Wong" userId="07b7957ca70a4ba9" providerId="LiveId" clId="{2952D031-7BD2-46F3-9967-CF46784C67A1}" dt="2020-01-18T14:16:54.791" v="190" actId="26606"/>
+          <ac:cxnSpMkLst>
+            <pc:docMk/>
+            <pc:sldMk cId="920351850" sldId="260"/>
+            <ac:cxnSpMk id="15" creationId="{5F76596F-57DF-4A0C-96D9-046DC3B30E9F}"/>
+          </ac:cxnSpMkLst>
+        </pc:cxnChg>
+        <pc:cxnChg chg="add">
+          <ac:chgData name="Patricia Wong" userId="07b7957ca70a4ba9" providerId="LiveId" clId="{2952D031-7BD2-46F3-9967-CF46784C67A1}" dt="2020-01-18T14:16:54.791" v="190" actId="26606"/>
+          <ac:cxnSpMkLst>
+            <pc:docMk/>
+            <pc:sldMk cId="920351850" sldId="260"/>
+            <ac:cxnSpMk id="26" creationId="{9E1CD25F-9744-41BE-A5C7-B2A5C98507E2}"/>
+          </ac:cxnSpMkLst>
+        </pc:cxnChg>
+      </pc:sldChg>
+      <pc:sldChg chg="addSp delSp modSp mod setBg">
+        <pc:chgData name="Patricia Wong" userId="07b7957ca70a4ba9" providerId="LiveId" clId="{2952D031-7BD2-46F3-9967-CF46784C67A1}" dt="2020-01-18T14:12:51.987" v="167" actId="20577"/>
+        <pc:sldMkLst>
+          <pc:docMk/>
+          <pc:sldMk cId="1163382788" sldId="261"/>
+        </pc:sldMkLst>
+        <pc:spChg chg="mod">
+          <ac:chgData name="Patricia Wong" userId="07b7957ca70a4ba9" providerId="LiveId" clId="{2952D031-7BD2-46F3-9967-CF46784C67A1}" dt="2020-01-18T14:07:29.242" v="5" actId="26606"/>
+          <ac:spMkLst>
+            <pc:docMk/>
+            <pc:sldMk cId="1163382788" sldId="261"/>
+            <ac:spMk id="2" creationId="{CA020079-45EA-4A3C-BBA1-F91FA3A54D13}"/>
+          </ac:spMkLst>
+        </pc:spChg>
+        <pc:spChg chg="mod">
+          <ac:chgData name="Patricia Wong" userId="07b7957ca70a4ba9" providerId="LiveId" clId="{2952D031-7BD2-46F3-9967-CF46784C67A1}" dt="2020-01-18T14:12:51.987" v="167" actId="20577"/>
+          <ac:spMkLst>
+            <pc:docMk/>
+            <pc:sldMk cId="1163382788" sldId="261"/>
+            <ac:spMk id="4" creationId="{C6FBDC75-DFDC-4E52-9362-1C78690B5DBF}"/>
+          </ac:spMkLst>
+        </pc:spChg>
+        <pc:spChg chg="add del">
+          <ac:chgData name="Patricia Wong" userId="07b7957ca70a4ba9" providerId="LiveId" clId="{2952D031-7BD2-46F3-9967-CF46784C67A1}" dt="2020-01-18T14:07:29.242" v="5" actId="26606"/>
+          <ac:spMkLst>
+            <pc:docMk/>
+            <pc:sldMk cId="1163382788" sldId="261"/>
+            <ac:spMk id="13" creationId="{86F828BE-4D4E-43F9-AC35-0209B5190C05}"/>
+          </ac:spMkLst>
+        </pc:spChg>
+        <pc:picChg chg="add mod">
+          <ac:chgData name="Patricia Wong" userId="07b7957ca70a4ba9" providerId="LiveId" clId="{2952D031-7BD2-46F3-9967-CF46784C67A1}" dt="2020-01-18T14:07:29.242" v="5" actId="26606"/>
+          <ac:picMkLst>
+            <pc:docMk/>
+            <pc:sldMk cId="1163382788" sldId="261"/>
+            <ac:picMk id="5" creationId="{F7100549-0437-4E2D-8BAD-1556C63CFCB0}"/>
+          </ac:picMkLst>
+        </pc:picChg>
+        <pc:picChg chg="mod ord">
+          <ac:chgData name="Patricia Wong" userId="07b7957ca70a4ba9" providerId="LiveId" clId="{2952D031-7BD2-46F3-9967-CF46784C67A1}" dt="2020-01-18T14:07:29.242" v="5" actId="26606"/>
+          <ac:picMkLst>
+            <pc:docMk/>
+            <pc:sldMk cId="1163382788" sldId="261"/>
+            <ac:picMk id="6" creationId="{42B0F4FE-B168-4D38-A6B7-E8DD2CCC7403}"/>
+          </ac:picMkLst>
+        </pc:picChg>
+        <pc:picChg chg="add del">
+          <ac:chgData name="Patricia Wong" userId="07b7957ca70a4ba9" providerId="LiveId" clId="{2952D031-7BD2-46F3-9967-CF46784C67A1}" dt="2020-01-18T14:07:29.242" v="5" actId="26606"/>
+          <ac:picMkLst>
+            <pc:docMk/>
+            <pc:sldMk cId="1163382788" sldId="261"/>
+            <ac:picMk id="11" creationId="{E8690AC4-C9C4-4944-A98C-B1D32992D60B}"/>
+          </ac:picMkLst>
+        </pc:picChg>
+        <pc:picChg chg="add del">
+          <ac:chgData name="Patricia Wong" userId="07b7957ca70a4ba9" providerId="LiveId" clId="{2952D031-7BD2-46F3-9967-CF46784C67A1}" dt="2020-01-18T14:07:29.242" v="5" actId="26606"/>
+          <ac:picMkLst>
+            <pc:docMk/>
+            <pc:sldMk cId="1163382788" sldId="261"/>
+            <ac:picMk id="17" creationId="{B049F9C0-FA09-470E-83AC-F293C347EDAC}"/>
+          </ac:picMkLst>
+        </pc:picChg>
+        <pc:cxnChg chg="add del">
+          <ac:chgData name="Patricia Wong" userId="07b7957ca70a4ba9" providerId="LiveId" clId="{2952D031-7BD2-46F3-9967-CF46784C67A1}" dt="2020-01-18T14:07:29.242" v="5" actId="26606"/>
+          <ac:cxnSpMkLst>
+            <pc:docMk/>
+            <pc:sldMk cId="1163382788" sldId="261"/>
+            <ac:cxnSpMk id="15" creationId="{10BAB604-20D4-431F-ADD8-754BB7992A43}"/>
+          </ac:cxnSpMkLst>
+        </pc:cxnChg>
+      </pc:sldChg>
+      <pc:sldChg chg="addSp delSp modSp del">
+        <pc:chgData name="Patricia Wong" userId="07b7957ca70a4ba9" providerId="LiveId" clId="{2952D031-7BD2-46F3-9967-CF46784C67A1}" dt="2020-01-18T14:09:36.774" v="122" actId="47"/>
+        <pc:sldMkLst>
+          <pc:docMk/>
+          <pc:sldMk cId="21958868" sldId="264"/>
+        </pc:sldMkLst>
+        <pc:spChg chg="add mod">
+          <ac:chgData name="Patricia Wong" userId="07b7957ca70a4ba9" providerId="LiveId" clId="{2952D031-7BD2-46F3-9967-CF46784C67A1}" dt="2020-01-18T14:09:33.834" v="121" actId="478"/>
+          <ac:spMkLst>
+            <pc:docMk/>
+            <pc:sldMk cId="21958868" sldId="264"/>
+            <ac:spMk id="3" creationId="{29AEE80B-07BA-4BC7-87B6-72A01F311BAD}"/>
+          </ac:spMkLst>
+        </pc:spChg>
+        <pc:picChg chg="del">
+          <ac:chgData name="Patricia Wong" userId="07b7957ca70a4ba9" providerId="LiveId" clId="{2952D031-7BD2-46F3-9967-CF46784C67A1}" dt="2020-01-18T14:09:33.834" v="121" actId="478"/>
+          <ac:picMkLst>
+            <pc:docMk/>
+            <pc:sldMk cId="21958868" sldId="264"/>
+            <ac:picMk id="8" creationId="{BD11A6CA-9F79-452F-8DDB-6559C32BDE7C}"/>
+          </ac:picMkLst>
+        </pc:picChg>
+        <pc:picChg chg="del">
+          <ac:chgData name="Patricia Wong" userId="07b7957ca70a4ba9" providerId="LiveId" clId="{2952D031-7BD2-46F3-9967-CF46784C67A1}" dt="2020-01-18T14:06:53.579" v="0" actId="478"/>
+          <ac:picMkLst>
+            <pc:docMk/>
+            <pc:sldMk cId="21958868" sldId="264"/>
+            <ac:picMk id="9" creationId="{10F996F4-3EF8-4B63-9162-1EB1A1C433BB}"/>
+          </ac:picMkLst>
+        </pc:picChg>
+      </pc:sldChg>
+      <pc:sldChg chg="addSp delSp modSp">
+        <pc:chgData name="Patricia Wong" userId="07b7957ca70a4ba9" providerId="LiveId" clId="{2952D031-7BD2-46F3-9967-CF46784C67A1}" dt="2020-01-18T14:14:06.298" v="180" actId="1076"/>
+        <pc:sldMkLst>
+          <pc:docMk/>
+          <pc:sldMk cId="1996614834" sldId="265"/>
+        </pc:sldMkLst>
+        <pc:spChg chg="add del mod">
+          <ac:chgData name="Patricia Wong" userId="07b7957ca70a4ba9" providerId="LiveId" clId="{2952D031-7BD2-46F3-9967-CF46784C67A1}" dt="2020-01-18T14:13:08.289" v="168"/>
+          <ac:spMkLst>
+            <pc:docMk/>
+            <pc:sldMk cId="1996614834" sldId="265"/>
+            <ac:spMk id="2" creationId="{C774FE8C-3852-4136-AC6E-2B9E3C582020}"/>
+          </ac:spMkLst>
+        </pc:spChg>
+        <pc:spChg chg="add mod">
+          <ac:chgData name="Patricia Wong" userId="07b7957ca70a4ba9" providerId="LiveId" clId="{2952D031-7BD2-46F3-9967-CF46784C67A1}" dt="2020-01-18T14:13:08.289" v="168"/>
+          <ac:spMkLst>
+            <pc:docMk/>
+            <pc:sldMk cId="1996614834" sldId="265"/>
+            <ac:spMk id="3" creationId="{8BC67FE0-2EAE-4A69-BEBF-1D36C721278D}"/>
+          </ac:spMkLst>
+        </pc:spChg>
+        <pc:spChg chg="add del mod">
+          <ac:chgData name="Patricia Wong" userId="07b7957ca70a4ba9" providerId="LiveId" clId="{2952D031-7BD2-46F3-9967-CF46784C67A1}" dt="2020-01-18T14:13:25.956" v="171" actId="478"/>
+          <ac:spMkLst>
+            <pc:docMk/>
+            <pc:sldMk cId="1996614834" sldId="265"/>
+            <ac:spMk id="4" creationId="{D1EED7EA-847B-4C5E-882A-C5F2DE7FB5AB}"/>
+          </ac:spMkLst>
+        </pc:spChg>
+        <pc:spChg chg="add del">
+          <ac:chgData name="Patricia Wong" userId="07b7957ca70a4ba9" providerId="LiveId" clId="{2952D031-7BD2-46F3-9967-CF46784C67A1}" dt="2020-01-18T14:13:08.289" v="168"/>
+          <ac:spMkLst>
+            <pc:docMk/>
+            <pc:sldMk cId="1996614834" sldId="265"/>
+            <ac:spMk id="7" creationId="{75142337-B7BA-4476-B522-8B1ABC1DA5AB}"/>
+          </ac:spMkLst>
+        </pc:spChg>
+        <pc:spChg chg="add del mod">
+          <ac:chgData name="Patricia Wong" userId="07b7957ca70a4ba9" providerId="LiveId" clId="{2952D031-7BD2-46F3-9967-CF46784C67A1}" dt="2020-01-18T14:13:08.289" v="168"/>
+          <ac:spMkLst>
+            <pc:docMk/>
+            <pc:sldMk cId="1996614834" sldId="265"/>
+            <ac:spMk id="9" creationId="{7BDEC8EE-5803-4C9C-9373-CE7935219F31}"/>
+          </ac:spMkLst>
+        </pc:spChg>
+        <pc:picChg chg="add del mod">
+          <ac:chgData name="Patricia Wong" userId="07b7957ca70a4ba9" providerId="LiveId" clId="{2952D031-7BD2-46F3-9967-CF46784C67A1}" dt="2020-01-18T14:12:37.878" v="163"/>
+          <ac:picMkLst>
+            <pc:docMk/>
+            <pc:sldMk cId="1996614834" sldId="265"/>
+            <ac:picMk id="8" creationId="{1A8075B1-7DED-497A-B362-689A7ED5E5F9}"/>
+          </ac:picMkLst>
+        </pc:picChg>
+        <pc:picChg chg="add mod">
+          <ac:chgData name="Patricia Wong" userId="07b7957ca70a4ba9" providerId="LiveId" clId="{2952D031-7BD2-46F3-9967-CF46784C67A1}" dt="2020-01-18T14:14:03.142" v="179" actId="1076"/>
+          <ac:picMkLst>
+            <pc:docMk/>
+            <pc:sldMk cId="1996614834" sldId="265"/>
+            <ac:picMk id="10" creationId="{865E1B73-2039-4A71-9CEB-40F7FFEA0E5C}"/>
+          </ac:picMkLst>
+        </pc:picChg>
+        <pc:picChg chg="del">
+          <ac:chgData name="Patricia Wong" userId="07b7957ca70a4ba9" providerId="LiveId" clId="{2952D031-7BD2-46F3-9967-CF46784C67A1}" dt="2020-01-18T14:07:02.389" v="1"/>
+          <ac:picMkLst>
+            <pc:docMk/>
+            <pc:sldMk cId="1996614834" sldId="265"/>
+            <ac:picMk id="11" creationId="{F9B1D0CF-928C-4D53-8FA9-D9E4CEA42E33}"/>
+          </ac:picMkLst>
+        </pc:picChg>
+        <pc:picChg chg="add mod">
+          <ac:chgData name="Patricia Wong" userId="07b7957ca70a4ba9" providerId="LiveId" clId="{2952D031-7BD2-46F3-9967-CF46784C67A1}" dt="2020-01-18T14:14:06.298" v="180" actId="1076"/>
+          <ac:picMkLst>
+            <pc:docMk/>
+            <pc:sldMk cId="1996614834" sldId="265"/>
+            <ac:picMk id="12" creationId="{7527D7DB-B66A-40D6-BB51-AA8C99E8E279}"/>
+          </ac:picMkLst>
+        </pc:picChg>
+        <pc:picChg chg="mod">
+          <ac:chgData name="Patricia Wong" userId="07b7957ca70a4ba9" providerId="LiveId" clId="{2952D031-7BD2-46F3-9967-CF46784C67A1}" dt="2020-01-18T14:13:56.967" v="178" actId="1076"/>
+          <ac:picMkLst>
+            <pc:docMk/>
+            <pc:sldMk cId="1996614834" sldId="265"/>
+            <ac:picMk id="13" creationId="{823CCFD0-F671-4541-89C3-6C4C162ACEDB}"/>
+          </ac:picMkLst>
+        </pc:picChg>
+      </pc:sldChg>
+      <pc:sldChg chg="addSp delSp modSp del">
+        <pc:chgData name="Patricia Wong" userId="07b7957ca70a4ba9" providerId="LiveId" clId="{2952D031-7BD2-46F3-9967-CF46784C67A1}" dt="2020-01-18T14:14:15.807" v="181" actId="47"/>
+        <pc:sldMkLst>
+          <pc:docMk/>
+          <pc:sldMk cId="971590439" sldId="266"/>
+        </pc:sldMkLst>
+        <pc:spChg chg="add del mod">
+          <ac:chgData name="Patricia Wong" userId="07b7957ca70a4ba9" providerId="LiveId" clId="{2952D031-7BD2-46F3-9967-CF46784C67A1}" dt="2020-01-18T14:12:38.591" v="164"/>
+          <ac:spMkLst>
+            <pc:docMk/>
+            <pc:sldMk cId="971590439" sldId="266"/>
+            <ac:spMk id="3" creationId="{98738351-8089-48EA-A14F-4023E7513062}"/>
+          </ac:spMkLst>
+        </pc:spChg>
+        <pc:spChg chg="add del mod">
+          <ac:chgData name="Patricia Wong" userId="07b7957ca70a4ba9" providerId="LiveId" clId="{2952D031-7BD2-46F3-9967-CF46784C67A1}" dt="2020-01-18T14:13:44.297" v="174" actId="478"/>
+          <ac:spMkLst>
+            <pc:docMk/>
+            <pc:sldMk cId="971590439" sldId="266"/>
+            <ac:spMk id="5" creationId="{FEC2A7A1-5CBA-49E7-BE1F-57D7F1407BCA}"/>
+          </ac:spMkLst>
+        </pc:spChg>
+        <pc:picChg chg="add del">
+          <ac:chgData name="Patricia Wong" userId="07b7957ca70a4ba9" providerId="LiveId" clId="{2952D031-7BD2-46F3-9967-CF46784C67A1}" dt="2020-01-18T14:13:18.481" v="170"/>
+          <ac:picMkLst>
+            <pc:docMk/>
+            <pc:sldMk cId="971590439" sldId="266"/>
+            <ac:picMk id="10" creationId="{E66763A5-58AB-4619-B847-B5CE645BB2C8}"/>
+          </ac:picMkLst>
+        </pc:picChg>
+        <pc:picChg chg="add del">
+          <ac:chgData name="Patricia Wong" userId="07b7957ca70a4ba9" providerId="LiveId" clId="{2952D031-7BD2-46F3-9967-CF46784C67A1}" dt="2020-01-18T14:13:47.127" v="175"/>
+          <ac:picMkLst>
+            <pc:docMk/>
+            <pc:sldMk cId="971590439" sldId="266"/>
+            <ac:picMk id="12" creationId="{5BD1674B-B41B-4374-9822-7B59CAB5A5BC}"/>
+          </ac:picMkLst>
+        </pc:picChg>
+      </pc:sldChg>
+    </pc:docChg>
+  </pc:docChgLst>
+</pc:chgInfo>
+</file>
+
 <file path=ppt/slideLayouts/slideLayout1.xml><?xml version="1.0" encoding="utf-8"?>
 <p:sldLayout xmlns:a="http://schemas.openxmlformats.org/drawingml/2006/main" xmlns:r="http://schemas.openxmlformats.org/officeDocument/2006/relationships" xmlns:p="http://schemas.openxmlformats.org/presentationml/2006/main" type="title" preserve="1">
   <p:cSld name="Title Slide">
@@ -260,7 +627,7 @@
           <a:p>
             <a:fld id="{48A87A34-81AB-432B-8DAE-1953F412C126}" type="datetimeFigureOut">
               <a:rPr lang="en-US" dirty="0"/>
-              <a:t>1/14/2020</a:t>
+              <a:t>1/18/2020</a:t>
             </a:fld>
             <a:endParaRPr lang="en-US" dirty="0"/>
           </a:p>
@@ -475,7 +842,7 @@
           <a:p>
             <a:fld id="{48A87A34-81AB-432B-8DAE-1953F412C126}" type="datetimeFigureOut">
               <a:rPr lang="en-US" dirty="0"/>
-              <a:t>1/14/2020</a:t>
+              <a:t>1/18/2020</a:t>
             </a:fld>
             <a:endParaRPr lang="en-US" dirty="0"/>
           </a:p>
@@ -694,7 +1061,7 @@
           <a:p>
             <a:fld id="{48A87A34-81AB-432B-8DAE-1953F412C126}" type="datetimeFigureOut">
               <a:rPr lang="en-US" dirty="0"/>
-              <a:t>1/14/2020</a:t>
+              <a:t>1/18/2020</a:t>
             </a:fld>
             <a:endParaRPr lang="en-US" dirty="0"/>
           </a:p>
@@ -904,7 +1271,7 @@
             <a:fld id="{48A87A34-81AB-432B-8DAE-1953F412C126}" type="datetimeFigureOut">
               <a:rPr lang="en-US" dirty="0"/>
               <a:pPr/>
-              <a:t>1/14/2020</a:t>
+              <a:t>1/18/2020</a:t>
             </a:fld>
             <a:endParaRPr lang="en-US" dirty="0"/>
           </a:p>
@@ -1191,7 +1558,7 @@
           <a:p>
             <a:fld id="{48A87A34-81AB-432B-8DAE-1953F412C126}" type="datetimeFigureOut">
               <a:rPr lang="en-US" dirty="0"/>
-              <a:t>1/14/2020</a:t>
+              <a:t>1/18/2020</a:t>
             </a:fld>
             <a:endParaRPr lang="en-US" dirty="0"/>
           </a:p>
@@ -1463,7 +1830,7 @@
           <a:p>
             <a:fld id="{48A87A34-81AB-432B-8DAE-1953F412C126}" type="datetimeFigureOut">
               <a:rPr lang="en-US" dirty="0"/>
-              <a:t>1/14/2020</a:t>
+              <a:t>1/18/2020</a:t>
             </a:fld>
             <a:endParaRPr lang="en-US" dirty="0"/>
           </a:p>
@@ -1883,7 +2250,7 @@
           <a:p>
             <a:fld id="{48A87A34-81AB-432B-8DAE-1953F412C126}" type="datetimeFigureOut">
               <a:rPr lang="en-US" dirty="0"/>
-              <a:t>1/14/2020</a:t>
+              <a:t>1/18/2020</a:t>
             </a:fld>
             <a:endParaRPr lang="en-US" dirty="0"/>
           </a:p>
@@ -2036,7 +2403,7 @@
           <a:p>
             <a:fld id="{48A87A34-81AB-432B-8DAE-1953F412C126}" type="datetimeFigureOut">
               <a:rPr lang="en-US" dirty="0"/>
-              <a:t>1/14/2020</a:t>
+              <a:t>1/18/2020</a:t>
             </a:fld>
             <a:endParaRPr lang="en-US" dirty="0"/>
           </a:p>
@@ -2166,7 +2533,7 @@
           <a:p>
             <a:fld id="{48A87A34-81AB-432B-8DAE-1953F412C126}" type="datetimeFigureOut">
               <a:rPr lang="en-US" dirty="0"/>
-              <a:t>1/14/2020</a:t>
+              <a:t>1/18/2020</a:t>
             </a:fld>
             <a:endParaRPr lang="en-US" dirty="0"/>
           </a:p>
@@ -2412,7 +2779,7 @@
           <a:p>
             <a:fld id="{48A87A34-81AB-432B-8DAE-1953F412C126}" type="datetimeFigureOut">
               <a:rPr lang="en-US" dirty="0"/>
-              <a:t>1/14/2020</a:t>
+              <a:t>1/18/2020</a:t>
             </a:fld>
             <a:endParaRPr lang="en-US" dirty="0"/>
           </a:p>
@@ -2868,7 +3235,7 @@
             <a:fld id="{48A87A34-81AB-432B-8DAE-1953F412C126}" type="datetimeFigureOut">
               <a:rPr lang="en-US" dirty="0"/>
               <a:pPr/>
-              <a:t>1/14/2020</a:t>
+              <a:t>1/18/2020</a:t>
             </a:fld>
             <a:endParaRPr lang="en-US" dirty="0"/>
           </a:p>
@@ -3246,7 +3613,7 @@
             <a:fld id="{48A87A34-81AB-432B-8DAE-1953F412C126}" type="datetimeFigureOut">
               <a:rPr lang="en-US" dirty="0"/>
               <a:pPr/>
-              <a:t>1/14/2020</a:t>
+              <a:t>1/18/2020</a:t>
             </a:fld>
             <a:endParaRPr lang="en-US" dirty="0"/>
           </a:p>
@@ -3766,93 +4133,6 @@
 </p:sld>
 </file>
 
-<file path=ppt/slides/slide10.xml><?xml version="1.0" encoding="utf-8"?>
-<p:sld xmlns:a="http://schemas.openxmlformats.org/drawingml/2006/main" xmlns:r="http://schemas.openxmlformats.org/officeDocument/2006/relationships" xmlns:p="http://schemas.openxmlformats.org/presentationml/2006/main">
-  <p:cSld>
-    <p:spTree>
-      <p:nvGrpSpPr>
-        <p:cNvPr id="1" name=""/>
-        <p:cNvGrpSpPr/>
-        <p:nvPr/>
-      </p:nvGrpSpPr>
-      <p:grpSpPr>
-        <a:xfrm>
-          <a:off x="0" y="0"/>
-          <a:ext cx="0" cy="0"/>
-          <a:chOff x="0" y="0"/>
-          <a:chExt cx="0" cy="0"/>
-        </a:xfrm>
-      </p:grpSpPr>
-      <p:sp>
-        <p:nvSpPr>
-          <p:cNvPr id="5" name="Title 4">
-            <a:extLst>
-              <a:ext uri="{FF2B5EF4-FFF2-40B4-BE49-F238E27FC236}">
-                <a16:creationId xmlns:a16="http://schemas.microsoft.com/office/drawing/2014/main" id="{AAA49BF6-9712-432C-9274-802E0822BA7A}"/>
-              </a:ext>
-            </a:extLst>
-          </p:cNvPr>
-          <p:cNvSpPr>
-            <a:spLocks noGrp="1"/>
-          </p:cNvSpPr>
-          <p:nvPr>
-            <p:ph type="title"/>
-          </p:nvPr>
-        </p:nvSpPr>
-        <p:spPr/>
-        <p:txBody>
-          <a:bodyPr/>
-          <a:lstStyle/>
-          <a:p>
-            <a:r>
-              <a:rPr lang="en-US" dirty="0"/>
-              <a:t>MongoDB Collection</a:t>
-            </a:r>
-          </a:p>
-        </p:txBody>
-      </p:sp>
-      <p:pic>
-        <p:nvPicPr>
-          <p:cNvPr id="12" name="Content Placeholder 11" descr="A screenshot of a cell phone&#10;&#10;Description automatically generated">
-            <a:extLst>
-              <a:ext uri="{FF2B5EF4-FFF2-40B4-BE49-F238E27FC236}">
-                <a16:creationId xmlns:a16="http://schemas.microsoft.com/office/drawing/2014/main" id="{0B590BF0-0BDA-4350-BD01-E7ABF632BF1D}"/>
-              </a:ext>
-            </a:extLst>
-          </p:cNvPr>
-          <p:cNvPicPr>
-            <a:picLocks noGrp="1" noChangeAspect="1"/>
-          </p:cNvPicPr>
-          <p:nvPr>
-            <p:ph idx="1"/>
-          </p:nvPr>
-        </p:nvPicPr>
-        <p:blipFill>
-          <a:blip r:embed="rId2"/>
-          <a:stretch>
-            <a:fillRect/>
-          </a:stretch>
-        </p:blipFill>
-        <p:spPr>
-          <a:xfrm>
-            <a:off x="1659405" y="2171700"/>
-            <a:ext cx="8544577" cy="3294063"/>
-          </a:xfrm>
-        </p:spPr>
-      </p:pic>
-    </p:spTree>
-    <p:extLst>
-      <p:ext uri="{BB962C8B-B14F-4D97-AF65-F5344CB8AC3E}">
-        <p14:creationId xmlns:p14="http://schemas.microsoft.com/office/powerpoint/2010/main" val="3027087588"/>
-      </p:ext>
-    </p:extLst>
-  </p:cSld>
-  <p:clrMapOvr>
-    <a:masterClrMapping/>
-  </p:clrMapOvr>
-</p:sld>
-</file>
-
 <file path=ppt/slides/slide2.xml><?xml version="1.0" encoding="utf-8"?>
 <p:sld xmlns:a="http://schemas.openxmlformats.org/drawingml/2006/main" xmlns:r="http://schemas.openxmlformats.org/officeDocument/2006/relationships" xmlns:p="http://schemas.openxmlformats.org/presentationml/2006/main">
   <p:cSld>
@@ -3991,10 +4271,10 @@
       </p:grpSpPr>
       <p:pic>
         <p:nvPicPr>
-          <p:cNvPr id="11" name="Picture 10">
+          <p:cNvPr id="22" name="Picture 21">
             <a:extLst>
               <a:ext uri="{FF2B5EF4-FFF2-40B4-BE49-F238E27FC236}">
-                <a16:creationId xmlns:a16="http://schemas.microsoft.com/office/drawing/2014/main" id="{CB1DE69F-569C-4A49-8E50-4093C135AECF}"/>
+                <a16:creationId xmlns:a16="http://schemas.microsoft.com/office/drawing/2014/main" id="{907B27AF-AFED-4FF4-8065-09E2ECD43159}"/>
               </a:ext>
               <a:ext uri="{C183D7F6-B498-43B3-948B-1728B52AA6E4}">
                 <adec:decorative xmlns:adec="http://schemas.microsoft.com/office/drawing/2017/decorative" val="1"/>
@@ -4035,10 +4315,10 @@
       </p:pic>
       <p:sp>
         <p:nvSpPr>
-          <p:cNvPr id="13" name="Rectangle 12">
+          <p:cNvPr id="24" name="Rectangle 23">
             <a:extLst>
               <a:ext uri="{FF2B5EF4-FFF2-40B4-BE49-F238E27FC236}">
-                <a16:creationId xmlns:a16="http://schemas.microsoft.com/office/drawing/2014/main" id="{50B488F5-9CE4-4346-B22F-600286ED4D8F}"/>
+                <a16:creationId xmlns:a16="http://schemas.microsoft.com/office/drawing/2014/main" id="{45B2D936-4E08-4928-90A3-EB1B6784A5DE}"/>
               </a:ext>
               <a:ext uri="{C183D7F6-B498-43B3-948B-1728B52AA6E4}">
                 <adec:decorative xmlns:adec="http://schemas.microsoft.com/office/drawing/2017/decorative" val="1"/>
@@ -4105,10 +4385,10 @@
       </p:sp>
       <p:cxnSp>
         <p:nvCxnSpPr>
-          <p:cNvPr id="15" name="Straight Connector 14">
+          <p:cNvPr id="26" name="Straight Connector 25">
             <a:extLst>
               <a:ext uri="{FF2B5EF4-FFF2-40B4-BE49-F238E27FC236}">
-                <a16:creationId xmlns:a16="http://schemas.microsoft.com/office/drawing/2014/main" id="{5F76596F-57DF-4A0C-96D9-046DC3B30E9F}"/>
+                <a16:creationId xmlns:a16="http://schemas.microsoft.com/office/drawing/2014/main" id="{9E1CD25F-9744-41BE-A5C7-B2A5C98507E2}"/>
               </a:ext>
               <a:ext uri="{C183D7F6-B498-43B3-948B-1728B52AA6E4}">
                 <adec:decorative xmlns:adec="http://schemas.microsoft.com/office/drawing/2017/decorative" val="1"/>
@@ -4159,10 +4439,10 @@
       </p:cxnSp>
       <p:pic>
         <p:nvPicPr>
-          <p:cNvPr id="17" name="Picture 16">
+          <p:cNvPr id="28" name="Picture 27">
             <a:extLst>
               <a:ext uri="{FF2B5EF4-FFF2-40B4-BE49-F238E27FC236}">
-                <a16:creationId xmlns:a16="http://schemas.microsoft.com/office/drawing/2014/main" id="{38DB3A91-B9E8-4451-ACED-026398635D07}"/>
+                <a16:creationId xmlns:a16="http://schemas.microsoft.com/office/drawing/2014/main" id="{AAFAFBB4-6847-45A2-97CE-8853D99697AC}"/>
               </a:ext>
               <a:ext uri="{C183D7F6-B498-43B3-948B-1728B52AA6E4}">
                 <adec:decorative xmlns:adec="http://schemas.microsoft.com/office/drawing/2017/decorative" val="1"/>
@@ -4230,43 +4510,8 @@
         </p:nvSpPr>
         <p:spPr>
           <a:xfrm>
-            <a:off x="1130271" y="2082202"/>
-            <a:ext cx="3587428" cy="2104119"/>
-          </a:xfrm>
-        </p:spPr>
-        <p:txBody>
-          <a:bodyPr vert="horz" lIns="91440" tIns="45720" rIns="91440" bIns="45720" rtlCol="0" anchor="ctr">
-            <a:normAutofit/>
-          </a:bodyPr>
-          <a:lstStyle/>
-          <a:p>
-            <a:r>
-              <a:rPr lang="en-US" sz="3200"/>
-              <a:t>Libraries utilized</a:t>
-            </a:r>
-          </a:p>
-        </p:txBody>
-      </p:sp>
-      <p:sp>
-        <p:nvSpPr>
-          <p:cNvPr id="4" name="Text Placeholder 3">
-            <a:extLst>
-              <a:ext uri="{FF2B5EF4-FFF2-40B4-BE49-F238E27FC236}">
-                <a16:creationId xmlns:a16="http://schemas.microsoft.com/office/drawing/2014/main" id="{83F2783B-6462-444F-A269-5A0E5E70C3B6}"/>
-              </a:ext>
-            </a:extLst>
-          </p:cNvPr>
-          <p:cNvSpPr>
-            <a:spLocks noGrp="1"/>
-          </p:cNvSpPr>
-          <p:nvPr>
-            <p:ph type="body" sz="half" idx="2"/>
-          </p:nvPr>
-        </p:nvSpPr>
-        <p:spPr>
-          <a:xfrm>
-            <a:off x="5041969" y="953324"/>
-            <a:ext cx="5691357" cy="1661115"/>
+            <a:off x="1130270" y="953324"/>
+            <a:ext cx="9603275" cy="1049235"/>
           </a:xfrm>
         </p:spPr>
         <p:txBody>
@@ -4275,39 +4520,45 @@
           </a:bodyPr>
           <a:lstStyle/>
           <a:p>
-            <a:pPr indent="-228600">
-              <a:buFont typeface="Arial" panose="020B0604020202020204" pitchFamily="34" charset="0"/>
-              <a:buChar char="•"/>
-            </a:pPr>
-            <a:endParaRPr lang="en-US"/>
-          </a:p>
-        </p:txBody>
-      </p:sp>
-      <p:sp>
-        <p:nvSpPr>
-          <p:cNvPr id="5" name="Content Placeholder 4">
+            <a:r>
+              <a:rPr lang="en-US" sz="3200"/>
+              <a:t>Libraries utilized</a:t>
+            </a:r>
+          </a:p>
+        </p:txBody>
+      </p:sp>
+      <p:pic>
+        <p:nvPicPr>
+          <p:cNvPr id="10" name="Content Placeholder 9" descr="A screenshot of a cell phone&#10;&#10;Description automatically generated">
             <a:extLst>
               <a:ext uri="{FF2B5EF4-FFF2-40B4-BE49-F238E27FC236}">
-                <a16:creationId xmlns:a16="http://schemas.microsoft.com/office/drawing/2014/main" id="{61DDC29B-8CC6-488C-A221-D2617518FA20}"/>
+                <a16:creationId xmlns:a16="http://schemas.microsoft.com/office/drawing/2014/main" id="{99B726DA-7D60-470A-B629-C6104373CD66}"/>
               </a:ext>
             </a:extLst>
           </p:cNvPr>
-          <p:cNvSpPr>
-            <a:spLocks noGrp="1"/>
-          </p:cNvSpPr>
+          <p:cNvPicPr>
+            <a:picLocks noGrp="1" noChangeAspect="1"/>
+          </p:cNvPicPr>
           <p:nvPr>
             <p:ph idx="1"/>
           </p:nvPr>
-        </p:nvSpPr>
-        <p:spPr/>
-        <p:txBody>
-          <a:bodyPr/>
-          <a:lstStyle/>
-          <a:p>
-            <a:endParaRPr lang="en-US"/>
-          </a:p>
-        </p:txBody>
-      </p:sp>
+        </p:nvPicPr>
+        <p:blipFill>
+          <a:blip r:embed="rId4"/>
+          <a:stretch>
+            <a:fillRect/>
+          </a:stretch>
+        </p:blipFill>
+        <p:spPr>
+          <a:xfrm>
+            <a:off x="1130270" y="2383115"/>
+            <a:ext cx="9598825" cy="2871884"/>
+          </a:xfrm>
+          <a:prstGeom prst="rect">
+            <a:avLst/>
+          </a:prstGeom>
+        </p:spPr>
+      </p:pic>
     </p:spTree>
     <p:extLst>
       <p:ext uri="{BB962C8B-B14F-4D97-AF65-F5344CB8AC3E}">
@@ -4790,7 +5041,7 @@
           <a:lstStyle/>
           <a:p>
             <a:r>
-              <a:rPr lang="en-US" dirty="0">
+              <a:rPr lang="en-US">
                 <a:solidFill>
                   <a:schemeClr val="accent1">
                     <a:lumMod val="75000"/>
@@ -4799,6 +5050,13 @@
               </a:rPr>
               <a:t>Transform</a:t>
             </a:r>
+            <a:endParaRPr lang="en-US" dirty="0">
+              <a:solidFill>
+                <a:schemeClr val="accent1">
+                  <a:lumMod val="75000"/>
+                </a:schemeClr>
+              </a:solidFill>
+            </a:endParaRPr>
           </a:p>
         </p:txBody>
       </p:sp>
@@ -4850,13 +5108,39 @@
         <p:spPr/>
         <p:txBody>
           <a:bodyPr>
-            <a:normAutofit fontScale="55000" lnSpcReduction="20000"/>
+            <a:normAutofit fontScale="47500" lnSpcReduction="20000"/>
           </a:bodyPr>
           <a:lstStyle/>
           <a:p>
             <a:r>
               <a:rPr lang="en-US" dirty="0"/>
-              <a:t>Several steps were followed to clean up the data such as:</a:t>
+              <a:t>The following steps were taken to clean up the data:</a:t>
+            </a:r>
+          </a:p>
+          <a:p>
+            <a:pPr marL="342900" indent="-342900">
+              <a:buFont typeface="Arial" panose="020B0604020202020204" pitchFamily="34" charset="0"/>
+              <a:buAutoNum type="arabicPeriod"/>
+            </a:pPr>
+            <a:r>
+              <a:rPr lang="en-US" dirty="0"/>
+              <a:t>Drop all the </a:t>
+            </a:r>
+            <a:r>
+              <a:rPr lang="en-US" dirty="0" err="1"/>
+              <a:t>Nas</a:t>
+            </a:r>
+            <a:r>
+              <a:rPr lang="en-US" dirty="0"/>
+              <a:t> in the </a:t>
+            </a:r>
+            <a:r>
+              <a:rPr lang="en-US" dirty="0" err="1"/>
+              <a:t>dataframe</a:t>
+            </a:r>
+            <a:r>
+              <a:rPr lang="en-US" dirty="0"/>
+              <a:t>.</a:t>
             </a:r>
           </a:p>
           <a:p>
@@ -4882,7 +5166,7 @@
             </a:pPr>
             <a:r>
               <a:rPr lang="en-US" dirty="0"/>
-              <a:t>The dash in the column occupation code was removed</a:t>
+              <a:t>The dash in the column occupation code was removed.</a:t>
             </a:r>
           </a:p>
           <a:p>
@@ -4914,6 +5198,36 @@
           </a:p>
         </p:txBody>
       </p:sp>
+      <p:pic>
+        <p:nvPicPr>
+          <p:cNvPr id="5" name="Content Placeholder 10" descr="A screenshot of a cell phone&#10;&#10;Description automatically generated">
+            <a:extLst>
+              <a:ext uri="{FF2B5EF4-FFF2-40B4-BE49-F238E27FC236}">
+                <a16:creationId xmlns:a16="http://schemas.microsoft.com/office/drawing/2014/main" id="{F7100549-0437-4E2D-8BAD-1556C63CFCB0}"/>
+              </a:ext>
+            </a:extLst>
+          </p:cNvPr>
+          <p:cNvPicPr>
+            <a:picLocks noChangeAspect="1"/>
+          </p:cNvPicPr>
+          <p:nvPr/>
+        </p:nvPicPr>
+        <p:blipFill>
+          <a:blip r:embed="rId3"/>
+          <a:stretch>
+            <a:fillRect/>
+          </a:stretch>
+        </p:blipFill>
+        <p:spPr>
+          <a:xfrm>
+            <a:off x="5408613" y="2780962"/>
+            <a:ext cx="6013450" cy="2058045"/>
+          </a:xfrm>
+          <a:prstGeom prst="rect">
+            <a:avLst/>
+          </a:prstGeom>
+        </p:spPr>
+      </p:pic>
     </p:spTree>
     <p:extLst>
       <p:ext uri="{BB962C8B-B14F-4D97-AF65-F5344CB8AC3E}">
@@ -4946,10 +5260,10 @@
       </p:grpSpPr>
       <p:sp>
         <p:nvSpPr>
-          <p:cNvPr id="12" name="Title 11">
+          <p:cNvPr id="3" name="Title 2">
             <a:extLst>
               <a:ext uri="{FF2B5EF4-FFF2-40B4-BE49-F238E27FC236}">
-                <a16:creationId xmlns:a16="http://schemas.microsoft.com/office/drawing/2014/main" id="{D2C99F24-4F35-4EBA-B921-445DF108D65D}"/>
+                <a16:creationId xmlns:a16="http://schemas.microsoft.com/office/drawing/2014/main" id="{8BC67FE0-2EAE-4A69-BEBF-1D36C721278D}"/>
               </a:ext>
             </a:extLst>
           </p:cNvPr>
@@ -4971,64 +5285,10 @@
       </p:sp>
       <p:pic>
         <p:nvPicPr>
-          <p:cNvPr id="8" name="Content Placeholder 7" descr="A screenshot of a cell phone&#10;&#10;Description automatically generated">
+          <p:cNvPr id="13" name="Picture 12" descr="A screenshot of a social media post&#10;&#10;Description automatically generated">
             <a:extLst>
               <a:ext uri="{FF2B5EF4-FFF2-40B4-BE49-F238E27FC236}">
-                <a16:creationId xmlns:a16="http://schemas.microsoft.com/office/drawing/2014/main" id="{BD11A6CA-9F79-452F-8DDB-6559C32BDE7C}"/>
-              </a:ext>
-            </a:extLst>
-          </p:cNvPr>
-          <p:cNvPicPr>
-            <a:picLocks noGrp="1" noChangeAspect="1"/>
-          </p:cNvPicPr>
-          <p:nvPr>
-            <p:ph idx="1"/>
-          </p:nvPr>
-        </p:nvPicPr>
-        <p:blipFill>
-          <a:blip r:embed="rId2"/>
-          <a:stretch>
-            <a:fillRect/>
-          </a:stretch>
-        </p:blipFill>
-        <p:spPr>
-          <a:xfrm>
-            <a:off x="6096000" y="1483520"/>
-            <a:ext cx="3652864" cy="695330"/>
-          </a:xfrm>
-        </p:spPr>
-      </p:pic>
-      <p:sp>
-        <p:nvSpPr>
-          <p:cNvPr id="13" name="Text Placeholder 12">
-            <a:extLst>
-              <a:ext uri="{FF2B5EF4-FFF2-40B4-BE49-F238E27FC236}">
-                <a16:creationId xmlns:a16="http://schemas.microsoft.com/office/drawing/2014/main" id="{FA2FF810-7583-4C5A-9AA1-B4861D5954D4}"/>
-              </a:ext>
-            </a:extLst>
-          </p:cNvPr>
-          <p:cNvSpPr>
-            <a:spLocks noGrp="1"/>
-          </p:cNvSpPr>
-          <p:nvPr>
-            <p:ph type="body" sz="half" idx="2"/>
-          </p:nvPr>
-        </p:nvSpPr>
-        <p:spPr/>
-        <p:txBody>
-          <a:bodyPr/>
-          <a:lstStyle/>
-          <a:p>
-            <a:endParaRPr lang="en-US"/>
-          </a:p>
-        </p:txBody>
-      </p:sp>
-      <p:pic>
-        <p:nvPicPr>
-          <p:cNvPr id="9" name="Picture 8" descr="A screenshot of a cell phone&#10;&#10;Description automatically generated">
-            <a:extLst>
-              <a:ext uri="{FF2B5EF4-FFF2-40B4-BE49-F238E27FC236}">
-                <a16:creationId xmlns:a16="http://schemas.microsoft.com/office/drawing/2014/main" id="{10F996F4-3EF8-4B63-9162-1EB1A1C433BB}"/>
+                <a16:creationId xmlns:a16="http://schemas.microsoft.com/office/drawing/2014/main" id="{823CCFD0-F671-4541-89C3-6C4C162ACEDB}"/>
               </a:ext>
             </a:extLst>
           </p:cNvPr>
@@ -5038,15 +5298,73 @@
           <p:nvPr/>
         </p:nvPicPr>
         <p:blipFill>
-          <a:blip r:embed="rId3"/>
+          <a:blip r:embed="rId2"/>
           <a:stretch>
             <a:fillRect/>
           </a:stretch>
         </p:blipFill>
         <p:spPr>
           <a:xfrm>
-            <a:off x="4568200" y="2460369"/>
-            <a:ext cx="7451734" cy="2454867"/>
+            <a:off x="1269385" y="753486"/>
+            <a:ext cx="9325043" cy="1976452"/>
+          </a:xfrm>
+          <a:prstGeom prst="rect">
+            <a:avLst/>
+          </a:prstGeom>
+        </p:spPr>
+      </p:pic>
+      <p:pic>
+        <p:nvPicPr>
+          <p:cNvPr id="10" name="Content Placeholder 9" descr="A screenshot of a cell phone&#10;&#10;Description automatically generated">
+            <a:extLst>
+              <a:ext uri="{FF2B5EF4-FFF2-40B4-BE49-F238E27FC236}">
+                <a16:creationId xmlns:a16="http://schemas.microsoft.com/office/drawing/2014/main" id="{865E1B73-2039-4A71-9CEB-40F7FFEA0E5C}"/>
+              </a:ext>
+            </a:extLst>
+          </p:cNvPr>
+          <p:cNvPicPr>
+            <a:picLocks noGrp="1" noChangeAspect="1"/>
+          </p:cNvPicPr>
+          <p:nvPr>
+            <p:ph idx="1"/>
+          </p:nvPr>
+        </p:nvPicPr>
+        <p:blipFill rotWithShape="1">
+          <a:blip r:embed="rId3"/>
+          <a:srcRect l="571" t="28014"/>
+          <a:stretch/>
+        </p:blipFill>
+        <p:spPr>
+          <a:xfrm>
+            <a:off x="3106463" y="2761224"/>
+            <a:ext cx="5979074" cy="1422270"/>
+          </a:xfrm>
+        </p:spPr>
+      </p:pic>
+      <p:pic>
+        <p:nvPicPr>
+          <p:cNvPr id="12" name="Picture 11" descr="A screenshot of a cell phone&#10;&#10;Description automatically generated">
+            <a:extLst>
+              <a:ext uri="{FF2B5EF4-FFF2-40B4-BE49-F238E27FC236}">
+                <a16:creationId xmlns:a16="http://schemas.microsoft.com/office/drawing/2014/main" id="{7527D7DB-B66A-40D6-BB51-AA8C99E8E279}"/>
+              </a:ext>
+            </a:extLst>
+          </p:cNvPr>
+          <p:cNvPicPr>
+            <a:picLocks noChangeAspect="1"/>
+          </p:cNvPicPr>
+          <p:nvPr/>
+        </p:nvPicPr>
+        <p:blipFill>
+          <a:blip r:embed="rId4"/>
+          <a:stretch>
+            <a:fillRect/>
+          </a:stretch>
+        </p:blipFill>
+        <p:spPr>
+          <a:xfrm>
+            <a:off x="3106463" y="4214780"/>
+            <a:ext cx="5979074" cy="1911217"/>
           </a:xfrm>
           <a:prstGeom prst="rect">
             <a:avLst/>
@@ -5056,7 +5374,7 @@
     </p:spTree>
     <p:extLst>
       <p:ext uri="{BB962C8B-B14F-4D97-AF65-F5344CB8AC3E}">
-        <p14:creationId xmlns:p14="http://schemas.microsoft.com/office/powerpoint/2010/main" val="21958868"/>
+        <p14:creationId xmlns:p14="http://schemas.microsoft.com/office/powerpoint/2010/main" val="1996614834"/>
       </p:ext>
     </p:extLst>
   </p:cSld>
@@ -5085,10 +5403,10 @@
       </p:grpSpPr>
       <p:sp>
         <p:nvSpPr>
-          <p:cNvPr id="7" name="Title 6">
+          <p:cNvPr id="2" name="Title 1">
             <a:extLst>
               <a:ext uri="{FF2B5EF4-FFF2-40B4-BE49-F238E27FC236}">
-                <a16:creationId xmlns:a16="http://schemas.microsoft.com/office/drawing/2014/main" id="{75142337-B7BA-4476-B522-8B1ABC1DA5AB}"/>
+                <a16:creationId xmlns:a16="http://schemas.microsoft.com/office/drawing/2014/main" id="{F280FC77-E193-40B2-B0AD-5B301189D698}"/>
               </a:ext>
             </a:extLst>
           </p:cNvPr>
@@ -5104,16 +5422,25 @@
           <a:bodyPr/>
           <a:lstStyle/>
           <a:p>
-            <a:endParaRPr lang="en-US"/>
+            <a:r>
+              <a:rPr lang="en-US" dirty="0">
+                <a:solidFill>
+                  <a:schemeClr val="accent1">
+                    <a:lumMod val="75000"/>
+                  </a:schemeClr>
+                </a:solidFill>
+              </a:rPr>
+              <a:t>Load</a:t>
+            </a:r>
           </a:p>
         </p:txBody>
       </p:sp>
       <p:pic>
         <p:nvPicPr>
-          <p:cNvPr id="11" name="Content Placeholder 10" descr="A screenshot of a cell phone&#10;&#10;Description automatically generated">
+          <p:cNvPr id="6" name="Content Placeholder 5" descr="A screenshot of a cell phone&#10;&#10;Description automatically generated">
             <a:extLst>
               <a:ext uri="{FF2B5EF4-FFF2-40B4-BE49-F238E27FC236}">
-                <a16:creationId xmlns:a16="http://schemas.microsoft.com/office/drawing/2014/main" id="{F9B1D0CF-928C-4D53-8FA9-D9E4CEA42E33}"/>
+                <a16:creationId xmlns:a16="http://schemas.microsoft.com/office/drawing/2014/main" id="{C85DBFE7-5500-4BAD-9740-0931EFFFE09D}"/>
               </a:ext>
             </a:extLst>
           </p:cNvPr>
@@ -5132,17 +5459,17 @@
         </p:blipFill>
         <p:spPr>
           <a:xfrm>
-            <a:off x="4708065" y="1084643"/>
-            <a:ext cx="6013450" cy="2058045"/>
+            <a:off x="4722813" y="1942000"/>
+            <a:ext cx="6013450" cy="2526324"/>
           </a:xfrm>
         </p:spPr>
       </p:pic>
       <p:sp>
         <p:nvSpPr>
-          <p:cNvPr id="9" name="Text Placeholder 8">
+          <p:cNvPr id="4" name="Text Placeholder 3">
             <a:extLst>
               <a:ext uri="{FF2B5EF4-FFF2-40B4-BE49-F238E27FC236}">
-                <a16:creationId xmlns:a16="http://schemas.microsoft.com/office/drawing/2014/main" id="{7BDEC8EE-5803-4C9C-9373-CE7935219F31}"/>
+                <a16:creationId xmlns:a16="http://schemas.microsoft.com/office/drawing/2014/main" id="{66954BEC-3902-4B5F-8CD8-884C64373D52}"/>
               </a:ext>
             </a:extLst>
           </p:cNvPr>
@@ -5155,47 +5482,40 @@
         </p:nvSpPr>
         <p:spPr/>
         <p:txBody>
-          <a:bodyPr/>
+          <a:bodyPr>
+            <a:normAutofit lnSpcReduction="10000"/>
+          </a:bodyPr>
           <a:lstStyle/>
           <a:p>
-            <a:endParaRPr lang="en-US"/>
-          </a:p>
-        </p:txBody>
-      </p:sp>
-      <p:pic>
-        <p:nvPicPr>
-          <p:cNvPr id="13" name="Picture 12" descr="A screenshot of a social media post&#10;&#10;Description automatically generated">
-            <a:extLst>
-              <a:ext uri="{FF2B5EF4-FFF2-40B4-BE49-F238E27FC236}">
-                <a16:creationId xmlns:a16="http://schemas.microsoft.com/office/drawing/2014/main" id="{823CCFD0-F671-4541-89C3-6C4C162ACEDB}"/>
-              </a:ext>
-            </a:extLst>
-          </p:cNvPr>
-          <p:cNvPicPr>
-            <a:picLocks noChangeAspect="1"/>
-          </p:cNvPicPr>
-          <p:nvPr/>
-        </p:nvPicPr>
-        <p:blipFill>
-          <a:blip r:embed="rId3"/>
-          <a:stretch>
-            <a:fillRect/>
-          </a:stretch>
-        </p:blipFill>
-        <p:spPr>
-          <a:xfrm>
-            <a:off x="2598600" y="3715313"/>
-            <a:ext cx="9325043" cy="1976452"/>
-          </a:xfrm>
-          <a:prstGeom prst="rect">
-            <a:avLst/>
-          </a:prstGeom>
-        </p:spPr>
-      </p:pic>
+            <a:r>
+              <a:rPr lang="en-US" dirty="0"/>
+              <a:t>MongoDB was the tool chosen to load the data dictionary into. </a:t>
+            </a:r>
+          </a:p>
+          <a:p>
+            <a:r>
+              <a:rPr lang="en-US" dirty="0" err="1"/>
+              <a:t>PyMongo</a:t>
+            </a:r>
+            <a:r>
+              <a:rPr lang="en-US" dirty="0"/>
+              <a:t> is used on </a:t>
+            </a:r>
+            <a:r>
+              <a:rPr lang="en-US" dirty="0" err="1"/>
+              <a:t>jupyter</a:t>
+            </a:r>
+            <a:r>
+              <a:rPr lang="en-US" dirty="0"/>
+              <a:t> notebook to connect the newly cleaned information into MongoDB. </a:t>
+            </a:r>
+          </a:p>
+        </p:txBody>
+      </p:sp>
     </p:spTree>
     <p:extLst>
       <p:ext uri="{BB962C8B-B14F-4D97-AF65-F5344CB8AC3E}">
-        <p14:creationId xmlns:p14="http://schemas.microsoft.com/office/powerpoint/2010/main" val="1996614834"/>
+        <p14:creationId xmlns:p14="http://schemas.microsoft.com/office/powerpoint/2010/main" val="704871865"/>
       </p:ext>
     </p:extLst>
   </p:cSld>
@@ -5224,10 +5544,10 @@
       </p:grpSpPr>
       <p:sp>
         <p:nvSpPr>
-          <p:cNvPr id="2" name="Title 1">
+          <p:cNvPr id="5" name="Title 4">
             <a:extLst>
               <a:ext uri="{FF2B5EF4-FFF2-40B4-BE49-F238E27FC236}">
-                <a16:creationId xmlns:a16="http://schemas.microsoft.com/office/drawing/2014/main" id="{906AF327-E776-43C6-8C05-13E6C74B9150}"/>
+                <a16:creationId xmlns:a16="http://schemas.microsoft.com/office/drawing/2014/main" id="{AAA49BF6-9712-432C-9274-802E0822BA7A}"/>
               </a:ext>
             </a:extLst>
           </p:cNvPr>
@@ -5243,163 +5563,19 @@
           <a:bodyPr/>
           <a:lstStyle/>
           <a:p>
-            <a:endParaRPr lang="en-US" dirty="0"/>
-          </a:p>
-        </p:txBody>
-      </p:sp>
-      <p:sp>
-        <p:nvSpPr>
-          <p:cNvPr id="4" name="Text Placeholder 3">
+            <a:r>
+              <a:rPr lang="en-US" dirty="0"/>
+              <a:t>MongoDB Collection</a:t>
+            </a:r>
+          </a:p>
+        </p:txBody>
+      </p:sp>
+      <p:pic>
+        <p:nvPicPr>
+          <p:cNvPr id="12" name="Content Placeholder 11" descr="A screenshot of a cell phone&#10;&#10;Description automatically generated">
             <a:extLst>
               <a:ext uri="{FF2B5EF4-FFF2-40B4-BE49-F238E27FC236}">
-                <a16:creationId xmlns:a16="http://schemas.microsoft.com/office/drawing/2014/main" id="{BB5326F3-5859-4CD2-BF03-24594C7ECBF6}"/>
-              </a:ext>
-            </a:extLst>
-          </p:cNvPr>
-          <p:cNvSpPr>
-            <a:spLocks noGrp="1"/>
-          </p:cNvSpPr>
-          <p:nvPr>
-            <p:ph type="body" sz="half" idx="2"/>
-          </p:nvPr>
-        </p:nvSpPr>
-        <p:spPr/>
-        <p:txBody>
-          <a:bodyPr/>
-          <a:lstStyle/>
-          <a:p>
-            <a:endParaRPr lang="en-US" dirty="0"/>
-          </a:p>
-        </p:txBody>
-      </p:sp>
-      <p:pic>
-        <p:nvPicPr>
-          <p:cNvPr id="10" name="Content Placeholder 9" descr="A screenshot of a cell phone&#10;&#10;Description automatically generated">
-            <a:extLst>
-              <a:ext uri="{FF2B5EF4-FFF2-40B4-BE49-F238E27FC236}">
-                <a16:creationId xmlns:a16="http://schemas.microsoft.com/office/drawing/2014/main" id="{E66763A5-58AB-4619-B847-B5CE645BB2C8}"/>
-              </a:ext>
-            </a:extLst>
-          </p:cNvPr>
-          <p:cNvPicPr>
-            <a:picLocks noGrp="1" noChangeAspect="1"/>
-          </p:cNvPicPr>
-          <p:nvPr>
-            <p:ph idx="1"/>
-          </p:nvPr>
-        </p:nvPicPr>
-        <p:blipFill rotWithShape="1">
-          <a:blip r:embed="rId2"/>
-          <a:srcRect l="571" t="28014"/>
-          <a:stretch/>
-        </p:blipFill>
-        <p:spPr>
-          <a:xfrm>
-            <a:off x="4882551" y="1121433"/>
-            <a:ext cx="5979074" cy="1422270"/>
-          </a:xfrm>
-        </p:spPr>
-      </p:pic>
-      <p:pic>
-        <p:nvPicPr>
-          <p:cNvPr id="12" name="Picture 11" descr="A screenshot of a cell phone&#10;&#10;Description automatically generated">
-            <a:extLst>
-              <a:ext uri="{FF2B5EF4-FFF2-40B4-BE49-F238E27FC236}">
-                <a16:creationId xmlns:a16="http://schemas.microsoft.com/office/drawing/2014/main" id="{5BD1674B-B41B-4374-9822-7B59CAB5A5BC}"/>
-              </a:ext>
-            </a:extLst>
-          </p:cNvPr>
-          <p:cNvPicPr>
-            <a:picLocks noChangeAspect="1"/>
-          </p:cNvPicPr>
-          <p:nvPr/>
-        </p:nvPicPr>
-        <p:blipFill>
-          <a:blip r:embed="rId3"/>
-          <a:stretch>
-            <a:fillRect/>
-          </a:stretch>
-        </p:blipFill>
-        <p:spPr>
-          <a:xfrm>
-            <a:off x="4882551" y="3005760"/>
-            <a:ext cx="5979074" cy="1911217"/>
-          </a:xfrm>
-          <a:prstGeom prst="rect">
-            <a:avLst/>
-          </a:prstGeom>
-        </p:spPr>
-      </p:pic>
-    </p:spTree>
-    <p:extLst>
-      <p:ext uri="{BB962C8B-B14F-4D97-AF65-F5344CB8AC3E}">
-        <p14:creationId xmlns:p14="http://schemas.microsoft.com/office/powerpoint/2010/main" val="971590439"/>
-      </p:ext>
-    </p:extLst>
-  </p:cSld>
-  <p:clrMapOvr>
-    <a:masterClrMapping/>
-  </p:clrMapOvr>
-</p:sld>
-</file>
-
-<file path=ppt/slides/slide9.xml><?xml version="1.0" encoding="utf-8"?>
-<p:sld xmlns:a="http://schemas.openxmlformats.org/drawingml/2006/main" xmlns:r="http://schemas.openxmlformats.org/officeDocument/2006/relationships" xmlns:p="http://schemas.openxmlformats.org/presentationml/2006/main">
-  <p:cSld>
-    <p:spTree>
-      <p:nvGrpSpPr>
-        <p:cNvPr id="1" name=""/>
-        <p:cNvGrpSpPr/>
-        <p:nvPr/>
-      </p:nvGrpSpPr>
-      <p:grpSpPr>
-        <a:xfrm>
-          <a:off x="0" y="0"/>
-          <a:ext cx="0" cy="0"/>
-          <a:chOff x="0" y="0"/>
-          <a:chExt cx="0" cy="0"/>
-        </a:xfrm>
-      </p:grpSpPr>
-      <p:sp>
-        <p:nvSpPr>
-          <p:cNvPr id="2" name="Title 1">
-            <a:extLst>
-              <a:ext uri="{FF2B5EF4-FFF2-40B4-BE49-F238E27FC236}">
-                <a16:creationId xmlns:a16="http://schemas.microsoft.com/office/drawing/2014/main" id="{F280FC77-E193-40B2-B0AD-5B301189D698}"/>
-              </a:ext>
-            </a:extLst>
-          </p:cNvPr>
-          <p:cNvSpPr>
-            <a:spLocks noGrp="1"/>
-          </p:cNvSpPr>
-          <p:nvPr>
-            <p:ph type="title"/>
-          </p:nvPr>
-        </p:nvSpPr>
-        <p:spPr/>
-        <p:txBody>
-          <a:bodyPr/>
-          <a:lstStyle/>
-          <a:p>
-            <a:r>
-              <a:rPr lang="en-US" dirty="0">
-                <a:solidFill>
-                  <a:schemeClr val="accent1">
-                    <a:lumMod val="75000"/>
-                  </a:schemeClr>
-                </a:solidFill>
-              </a:rPr>
-              <a:t>Load</a:t>
-            </a:r>
-          </a:p>
-        </p:txBody>
-      </p:sp>
-      <p:pic>
-        <p:nvPicPr>
-          <p:cNvPr id="6" name="Content Placeholder 5" descr="A screenshot of a cell phone&#10;&#10;Description automatically generated">
-            <a:extLst>
-              <a:ext uri="{FF2B5EF4-FFF2-40B4-BE49-F238E27FC236}">
-                <a16:creationId xmlns:a16="http://schemas.microsoft.com/office/drawing/2014/main" id="{C85DBFE7-5500-4BAD-9740-0931EFFFE09D}"/>
+                <a16:creationId xmlns:a16="http://schemas.microsoft.com/office/drawing/2014/main" id="{0B590BF0-0BDA-4350-BD01-E7ABF632BF1D}"/>
               </a:ext>
             </a:extLst>
           </p:cNvPr>
@@ -5418,63 +5594,15 @@
         </p:blipFill>
         <p:spPr>
           <a:xfrm>
-            <a:off x="4722813" y="1942000"/>
-            <a:ext cx="6013450" cy="2526324"/>
+            <a:off x="1659405" y="2171700"/>
+            <a:ext cx="8544577" cy="3294063"/>
           </a:xfrm>
         </p:spPr>
       </p:pic>
-      <p:sp>
-        <p:nvSpPr>
-          <p:cNvPr id="4" name="Text Placeholder 3">
-            <a:extLst>
-              <a:ext uri="{FF2B5EF4-FFF2-40B4-BE49-F238E27FC236}">
-                <a16:creationId xmlns:a16="http://schemas.microsoft.com/office/drawing/2014/main" id="{66954BEC-3902-4B5F-8CD8-884C64373D52}"/>
-              </a:ext>
-            </a:extLst>
-          </p:cNvPr>
-          <p:cNvSpPr>
-            <a:spLocks noGrp="1"/>
-          </p:cNvSpPr>
-          <p:nvPr>
-            <p:ph type="body" sz="half" idx="2"/>
-          </p:nvPr>
-        </p:nvSpPr>
-        <p:spPr/>
-        <p:txBody>
-          <a:bodyPr>
-            <a:normAutofit lnSpcReduction="10000"/>
-          </a:bodyPr>
-          <a:lstStyle/>
-          <a:p>
-            <a:r>
-              <a:rPr lang="en-US" dirty="0"/>
-              <a:t>MongoDB was the tool chosen to load the data dictionary into. </a:t>
-            </a:r>
-          </a:p>
-          <a:p>
-            <a:r>
-              <a:rPr lang="en-US" dirty="0" err="1"/>
-              <a:t>PyMongo</a:t>
-            </a:r>
-            <a:r>
-              <a:rPr lang="en-US" dirty="0"/>
-              <a:t> is used on </a:t>
-            </a:r>
-            <a:r>
-              <a:rPr lang="en-US" dirty="0" err="1"/>
-              <a:t>jupyter</a:t>
-            </a:r>
-            <a:r>
-              <a:rPr lang="en-US" dirty="0"/>
-              <a:t> notebook to connect the newly cleaned information into MongoDB. </a:t>
-            </a:r>
-          </a:p>
-        </p:txBody>
-      </p:sp>
     </p:spTree>
     <p:extLst>
       <p:ext uri="{BB962C8B-B14F-4D97-AF65-F5344CB8AC3E}">
-        <p14:creationId xmlns:p14="http://schemas.microsoft.com/office/powerpoint/2010/main" val="704871865"/>
+        <p14:creationId xmlns:p14="http://schemas.microsoft.com/office/powerpoint/2010/main" val="3027087588"/>
       </p:ext>
     </p:extLst>
   </p:cSld>

</xml_diff>